<commit_message>
Adding presentation new version
</commit_message>
<xml_diff>
--- a/presentation/Presentation.pptx
+++ b/presentation/Presentation.pptx
@@ -220,7 +220,7 @@
           <a:p>
             <a:fld id="{3055C09D-E245-48FB-89F4-1FC6DB8B2588}" type="datetimeFigureOut">
               <a:rPr lang="en-US"/>
-              <a:t>5/16/2017</a:t>
+              <a:t>5/17/2017</a:t>
             </a:fld>
             <a:endParaRPr lang="en-US"/>
           </a:p>
@@ -717,7 +717,7 @@
             <a:fld id="{B61BEF0D-F0BB-DE4B-95CE-6DB70DBA9567}" type="datetimeFigureOut">
               <a:rPr lang="en-US" dirty="0"/>
               <a:pPr/>
-              <a:t>5/16/2017</a:t>
+              <a:t>5/17/2017</a:t>
             </a:fld>
             <a:endParaRPr lang="en-US" dirty="0"/>
           </a:p>
@@ -1048,7 +1048,7 @@
             <a:fld id="{B61BEF0D-F0BB-DE4B-95CE-6DB70DBA9567}" type="datetimeFigureOut">
               <a:rPr lang="en-US" dirty="0"/>
               <a:pPr/>
-              <a:t>5/16/2017</a:t>
+              <a:t>5/17/2017</a:t>
             </a:fld>
             <a:endParaRPr lang="en-US" dirty="0"/>
           </a:p>
@@ -1323,7 +1323,7 @@
             <a:fld id="{B61BEF0D-F0BB-DE4B-95CE-6DB70DBA9567}" type="datetimeFigureOut">
               <a:rPr lang="en-US" dirty="0"/>
               <a:pPr/>
-              <a:t>5/16/2017</a:t>
+              <a:t>5/17/2017</a:t>
             </a:fld>
             <a:endParaRPr lang="en-US" dirty="0"/>
           </a:p>
@@ -1888,7 +1888,7 @@
             <a:fld id="{B61BEF0D-F0BB-DE4B-95CE-6DB70DBA9567}" type="datetimeFigureOut">
               <a:rPr lang="en-US" dirty="0"/>
               <a:pPr/>
-              <a:t>5/16/2017</a:t>
+              <a:t>5/17/2017</a:t>
             </a:fld>
             <a:endParaRPr lang="en-US" dirty="0"/>
           </a:p>
@@ -2163,7 +2163,7 @@
             <a:fld id="{B61BEF0D-F0BB-DE4B-95CE-6DB70DBA9567}" type="datetimeFigureOut">
               <a:rPr lang="en-US" dirty="0"/>
               <a:pPr/>
-              <a:t>5/16/2017</a:t>
+              <a:t>5/17/2017</a:t>
             </a:fld>
             <a:endParaRPr lang="en-US" dirty="0"/>
           </a:p>
@@ -2722,7 +2722,7 @@
             <a:fld id="{B61BEF0D-F0BB-DE4B-95CE-6DB70DBA9567}" type="datetimeFigureOut">
               <a:rPr lang="en-US" dirty="0"/>
               <a:pPr/>
-              <a:t>5/16/2017</a:t>
+              <a:t>5/17/2017</a:t>
             </a:fld>
             <a:endParaRPr lang="en-US" dirty="0"/>
           </a:p>
@@ -3046,7 +3046,7 @@
             <a:fld id="{B61BEF0D-F0BB-DE4B-95CE-6DB70DBA9567}" type="datetimeFigureOut">
               <a:rPr lang="en-US" dirty="0"/>
               <a:pPr/>
-              <a:t>5/16/2017</a:t>
+              <a:t>5/17/2017</a:t>
             </a:fld>
             <a:endParaRPr lang="en-US" dirty="0"/>
           </a:p>
@@ -3220,7 +3220,7 @@
             <a:fld id="{B61BEF0D-F0BB-DE4B-95CE-6DB70DBA9567}" type="datetimeFigureOut">
               <a:rPr lang="en-US" dirty="0"/>
               <a:pPr/>
-              <a:t>5/16/2017</a:t>
+              <a:t>5/17/2017</a:t>
             </a:fld>
             <a:endParaRPr lang="en-US" dirty="0"/>
           </a:p>
@@ -3455,7 +3455,7 @@
             <a:fld id="{B61BEF0D-F0BB-DE4B-95CE-6DB70DBA9567}" type="datetimeFigureOut">
               <a:rPr lang="en-US" dirty="0"/>
               <a:pPr/>
-              <a:t>5/16/2017</a:t>
+              <a:t>5/17/2017</a:t>
             </a:fld>
             <a:endParaRPr lang="en-US" dirty="0"/>
           </a:p>
@@ -3652,7 +3652,7 @@
             <a:fld id="{B61BEF0D-F0BB-DE4B-95CE-6DB70DBA9567}" type="datetimeFigureOut">
               <a:rPr lang="en-US" dirty="0"/>
               <a:pPr/>
-              <a:t>5/16/2017</a:t>
+              <a:t>5/17/2017</a:t>
             </a:fld>
             <a:endParaRPr lang="en-US" dirty="0"/>
           </a:p>
@@ -3925,7 +3925,7 @@
             <a:fld id="{B61BEF0D-F0BB-DE4B-95CE-6DB70DBA9567}" type="datetimeFigureOut">
               <a:rPr lang="en-US" dirty="0"/>
               <a:pPr/>
-              <a:t>5/16/2017</a:t>
+              <a:t>5/17/2017</a:t>
             </a:fld>
             <a:endParaRPr lang="en-US" dirty="0"/>
           </a:p>
@@ -4188,7 +4188,7 @@
             <a:fld id="{B61BEF0D-F0BB-DE4B-95CE-6DB70DBA9567}" type="datetimeFigureOut">
               <a:rPr lang="en-US" dirty="0"/>
               <a:pPr/>
-              <a:t>5/16/2017</a:t>
+              <a:t>5/17/2017</a:t>
             </a:fld>
             <a:endParaRPr lang="en-US" dirty="0"/>
           </a:p>
@@ -4559,7 +4559,7 @@
             <a:fld id="{B61BEF0D-F0BB-DE4B-95CE-6DB70DBA9567}" type="datetimeFigureOut">
               <a:rPr lang="en-US" dirty="0"/>
               <a:pPr/>
-              <a:t>5/16/2017</a:t>
+              <a:t>5/17/2017</a:t>
             </a:fld>
             <a:endParaRPr lang="en-US" dirty="0"/>
           </a:p>
@@ -4704,7 +4704,7 @@
             <a:fld id="{B61BEF0D-F0BB-DE4B-95CE-6DB70DBA9567}" type="datetimeFigureOut">
               <a:rPr lang="en-US" dirty="0"/>
               <a:pPr/>
-              <a:t>5/16/2017</a:t>
+              <a:t>5/17/2017</a:t>
             </a:fld>
             <a:endParaRPr lang="en-US" dirty="0"/>
           </a:p>
@@ -4826,7 +4826,7 @@
             <a:fld id="{B61BEF0D-F0BB-DE4B-95CE-6DB70DBA9567}" type="datetimeFigureOut">
               <a:rPr lang="en-US" dirty="0"/>
               <a:pPr/>
-              <a:t>5/16/2017</a:t>
+              <a:t>5/17/2017</a:t>
             </a:fld>
             <a:endParaRPr lang="en-US" dirty="0"/>
           </a:p>
@@ -5108,7 +5108,7 @@
             <a:fld id="{B61BEF0D-F0BB-DE4B-95CE-6DB70DBA9567}" type="datetimeFigureOut">
               <a:rPr lang="en-US" dirty="0"/>
               <a:pPr/>
-              <a:t>5/16/2017</a:t>
+              <a:t>5/17/2017</a:t>
             </a:fld>
             <a:endParaRPr lang="en-US" dirty="0"/>
           </a:p>
@@ -5429,7 +5429,7 @@
             <a:fld id="{B61BEF0D-F0BB-DE4B-95CE-6DB70DBA9567}" type="datetimeFigureOut">
               <a:rPr lang="en-US" dirty="0"/>
               <a:pPr/>
-              <a:t>5/16/2017</a:t>
+              <a:t>5/17/2017</a:t>
             </a:fld>
             <a:endParaRPr lang="en-US" dirty="0"/>
           </a:p>
@@ -5640,7 +5640,7 @@
             <a:fld id="{B61BEF0D-F0BB-DE4B-95CE-6DB70DBA9567}" type="datetimeFigureOut">
               <a:rPr lang="en-US" dirty="0"/>
               <a:pPr/>
-              <a:t>5/16/2017</a:t>
+              <a:t>5/17/2017</a:t>
             </a:fld>
             <a:endParaRPr lang="en-US" dirty="0"/>
           </a:p>
@@ -6159,7 +6159,12 @@
             <p:ph type="ctrTitle"/>
           </p:nvPr>
         </p:nvSpPr>
-        <p:spPr/>
+        <p:spPr>
+          <a:xfrm>
+            <a:off x="3661063" y="2411076"/>
+            <a:ext cx="7197726" cy="2421464"/>
+          </a:xfrm>
+        </p:spPr>
         <p:txBody>
           <a:bodyPr>
             <a:normAutofit fontScale="90000"/>
@@ -6193,9 +6198,88 @@
   <p:timing>
     <p:tnLst>
       <p:par>
-        <p:cTn id="1" dur="indefinite" restart="never" nodeType="tmRoot"/>
+        <p:cTn id="1" dur="indefinite" restart="never" nodeType="tmRoot">
+          <p:childTnLst>
+            <p:seq concurrent="1" nextAc="seek">
+              <p:cTn id="2" dur="indefinite" nodeType="mainSeq">
+                <p:childTnLst>
+                  <p:par>
+                    <p:cTn id="3" fill="hold">
+                      <p:stCondLst>
+                        <p:cond delay="indefinite"/>
+                      </p:stCondLst>
+                      <p:childTnLst>
+                        <p:par>
+                          <p:cTn id="4" fill="hold">
+                            <p:stCondLst>
+                              <p:cond delay="0"/>
+                            </p:stCondLst>
+                            <p:childTnLst>
+                              <p:par>
+                                <p:cTn id="5" presetID="10" presetClass="entr" presetSubtype="0" fill="hold" grpId="0" nodeType="clickEffect">
+                                  <p:stCondLst>
+                                    <p:cond delay="0"/>
+                                  </p:stCondLst>
+                                  <p:childTnLst>
+                                    <p:set>
+                                      <p:cBhvr>
+                                        <p:cTn id="6" dur="1" fill="hold">
+                                          <p:stCondLst>
+                                            <p:cond delay="0"/>
+                                          </p:stCondLst>
+                                        </p:cTn>
+                                        <p:tgtEl>
+                                          <p:spTgt spid="2"/>
+                                        </p:tgtEl>
+                                        <p:attrNameLst>
+                                          <p:attrName>style.visibility</p:attrName>
+                                        </p:attrNameLst>
+                                      </p:cBhvr>
+                                      <p:to>
+                                        <p:strVal val="visible"/>
+                                      </p:to>
+                                    </p:set>
+                                    <p:animEffect transition="in" filter="fade">
+                                      <p:cBhvr>
+                                        <p:cTn id="7" dur="500"/>
+                                        <p:tgtEl>
+                                          <p:spTgt spid="2"/>
+                                        </p:tgtEl>
+                                      </p:cBhvr>
+                                    </p:animEffect>
+                                  </p:childTnLst>
+                                </p:cTn>
+                              </p:par>
+                            </p:childTnLst>
+                          </p:cTn>
+                        </p:par>
+                      </p:childTnLst>
+                    </p:cTn>
+                  </p:par>
+                </p:childTnLst>
+              </p:cTn>
+              <p:prevCondLst>
+                <p:cond evt="onPrev" delay="0">
+                  <p:tgtEl>
+                    <p:sldTgt/>
+                  </p:tgtEl>
+                </p:cond>
+              </p:prevCondLst>
+              <p:nextCondLst>
+                <p:cond evt="onNext" delay="0">
+                  <p:tgtEl>
+                    <p:sldTgt/>
+                  </p:tgtEl>
+                </p:cond>
+              </p:nextCondLst>
+            </p:seq>
+          </p:childTnLst>
+        </p:cTn>
       </p:par>
     </p:tnLst>
+    <p:bldLst>
+      <p:bldP spid="2" grpId="0"/>
+    </p:bldLst>
   </p:timing>
 </p:sld>
 </file>
@@ -7213,35 +7297,35 @@
                     <a:gridCol w="999490">
                       <a:extLst>
                         <a:ext uri="{9D8B030D-6E8A-4147-A177-3AD203B41FA5}">
-                          <a16:colId xmlns:a16="http://schemas.microsoft.com/office/drawing/2014/main" val="1216725777"/>
+                          <a16:colId xmlns:a16="http://schemas.microsoft.com/office/drawing/2014/main" xmlns="" val="1216725777"/>
                         </a:ext>
                       </a:extLst>
                     </a:gridCol>
                     <a:gridCol w="999490">
                       <a:extLst>
                         <a:ext uri="{9D8B030D-6E8A-4147-A177-3AD203B41FA5}">
-                          <a16:colId xmlns:a16="http://schemas.microsoft.com/office/drawing/2014/main" val="1506238522"/>
+                          <a16:colId xmlns:a16="http://schemas.microsoft.com/office/drawing/2014/main" xmlns="" val="1506238522"/>
                         </a:ext>
                       </a:extLst>
                     </a:gridCol>
                     <a:gridCol w="999490">
                       <a:extLst>
                         <a:ext uri="{9D8B030D-6E8A-4147-A177-3AD203B41FA5}">
-                          <a16:colId xmlns:a16="http://schemas.microsoft.com/office/drawing/2014/main" val="2836820485"/>
+                          <a16:colId xmlns:a16="http://schemas.microsoft.com/office/drawing/2014/main" xmlns="" val="2836820485"/>
                         </a:ext>
                       </a:extLst>
                     </a:gridCol>
                     <a:gridCol w="999490">
                       <a:extLst>
                         <a:ext uri="{9D8B030D-6E8A-4147-A177-3AD203B41FA5}">
-                          <a16:colId xmlns:a16="http://schemas.microsoft.com/office/drawing/2014/main" val="1651784423"/>
+                          <a16:colId xmlns:a16="http://schemas.microsoft.com/office/drawing/2014/main" xmlns="" val="1651784423"/>
                         </a:ext>
                       </a:extLst>
                     </a:gridCol>
                     <a:gridCol w="999490">
                       <a:extLst>
                         <a:ext uri="{9D8B030D-6E8A-4147-A177-3AD203B41FA5}">
-                          <a16:colId xmlns:a16="http://schemas.microsoft.com/office/drawing/2014/main" val="1257235431"/>
+                          <a16:colId xmlns:a16="http://schemas.microsoft.com/office/drawing/2014/main" xmlns="" val="1257235431"/>
                         </a:ext>
                       </a:extLst>
                     </a:gridCol>
@@ -7562,7 +7646,7 @@
                     </a:tc>
                     <a:extLst>
                       <a:ext uri="{0D108BD9-81ED-4DB2-BD59-A6C34878D82A}">
-                        <a16:rowId xmlns:a16="http://schemas.microsoft.com/office/drawing/2014/main" val="1324942624"/>
+                        <a16:rowId xmlns:a16="http://schemas.microsoft.com/office/drawing/2014/main" xmlns="" val="1324942624"/>
                       </a:ext>
                     </a:extLst>
                   </a:tr>
@@ -7750,7 +7834,7 @@
                     </a:tc>
                     <a:extLst>
                       <a:ext uri="{0D108BD9-81ED-4DB2-BD59-A6C34878D82A}">
-                        <a16:rowId xmlns:a16="http://schemas.microsoft.com/office/drawing/2014/main" val="2491110305"/>
+                        <a16:rowId xmlns:a16="http://schemas.microsoft.com/office/drawing/2014/main" xmlns="" val="2491110305"/>
                       </a:ext>
                     </a:extLst>
                   </a:tr>
@@ -7938,7 +8022,7 @@
                     </a:tc>
                     <a:extLst>
                       <a:ext uri="{0D108BD9-81ED-4DB2-BD59-A6C34878D82A}">
-                        <a16:rowId xmlns:a16="http://schemas.microsoft.com/office/drawing/2014/main" val="1031351399"/>
+                        <a16:rowId xmlns:a16="http://schemas.microsoft.com/office/drawing/2014/main" xmlns="" val="1031351399"/>
                       </a:ext>
                     </a:extLst>
                   </a:tr>
@@ -8126,7 +8210,7 @@
                     </a:tc>
                     <a:extLst>
                       <a:ext uri="{0D108BD9-81ED-4DB2-BD59-A6C34878D82A}">
-                        <a16:rowId xmlns:a16="http://schemas.microsoft.com/office/drawing/2014/main" val="1041437350"/>
+                        <a16:rowId xmlns:a16="http://schemas.microsoft.com/office/drawing/2014/main" xmlns="" val="1041437350"/>
                       </a:ext>
                     </a:extLst>
                   </a:tr>
@@ -8308,7 +8392,7 @@
                     </a:tc>
                     <a:extLst>
                       <a:ext uri="{0D108BD9-81ED-4DB2-BD59-A6C34878D82A}">
-                        <a16:rowId xmlns:a16="http://schemas.microsoft.com/office/drawing/2014/main" val="2051532882"/>
+                        <a16:rowId xmlns:a16="http://schemas.microsoft.com/office/drawing/2014/main" xmlns="" val="2051532882"/>
                       </a:ext>
                     </a:extLst>
                   </a:tr>
@@ -8496,7 +8580,7 @@
                     </a:tc>
                     <a:extLst>
                       <a:ext uri="{0D108BD9-81ED-4DB2-BD59-A6C34878D82A}">
-                        <a16:rowId xmlns:a16="http://schemas.microsoft.com/office/drawing/2014/main" val="4146497862"/>
+                        <a16:rowId xmlns:a16="http://schemas.microsoft.com/office/drawing/2014/main" xmlns="" val="4146497862"/>
                       </a:ext>
                     </a:extLst>
                   </a:tr>
@@ -8587,7 +8671,7 @@
                     </a:tc>
                     <a:extLst>
                       <a:ext uri="{0D108BD9-81ED-4DB2-BD59-A6C34878D82A}">
-                        <a16:rowId xmlns:a16="http://schemas.microsoft.com/office/drawing/2014/main" val="766546503"/>
+                        <a16:rowId xmlns:a16="http://schemas.microsoft.com/office/drawing/2014/main" xmlns="" val="766546503"/>
                       </a:ext>
                     </a:extLst>
                   </a:tr>
@@ -10145,21 +10229,21 @@
                 <a:gridCol w="820021">
                   <a:extLst>
                     <a:ext uri="{9D8B030D-6E8A-4147-A177-3AD203B41FA5}">
-                      <a16:colId xmlns:a16="http://schemas.microsoft.com/office/drawing/2014/main" val="20000"/>
+                      <a16:colId xmlns:a16="http://schemas.microsoft.com/office/drawing/2014/main" xmlns="" val="20000"/>
                     </a:ext>
                   </a:extLst>
                 </a:gridCol>
                 <a:gridCol w="820021">
                   <a:extLst>
                     <a:ext uri="{9D8B030D-6E8A-4147-A177-3AD203B41FA5}">
-                      <a16:colId xmlns:a16="http://schemas.microsoft.com/office/drawing/2014/main" val="20001"/>
+                      <a16:colId xmlns:a16="http://schemas.microsoft.com/office/drawing/2014/main" xmlns="" val="20001"/>
                     </a:ext>
                   </a:extLst>
                 </a:gridCol>
                 <a:gridCol w="820872">
                   <a:extLst>
                     <a:ext uri="{9D8B030D-6E8A-4147-A177-3AD203B41FA5}">
-                      <a16:colId xmlns:a16="http://schemas.microsoft.com/office/drawing/2014/main" val="20002"/>
+                      <a16:colId xmlns:a16="http://schemas.microsoft.com/office/drawing/2014/main" xmlns="" val="20002"/>
                     </a:ext>
                   </a:extLst>
                 </a:gridCol>
@@ -10263,7 +10347,7 @@
                 </a:tc>
                 <a:extLst>
                   <a:ext uri="{0D108BD9-81ED-4DB2-BD59-A6C34878D82A}">
-                    <a16:rowId xmlns:a16="http://schemas.microsoft.com/office/drawing/2014/main" val="10000"/>
+                    <a16:rowId xmlns:a16="http://schemas.microsoft.com/office/drawing/2014/main" xmlns="" val="10000"/>
                   </a:ext>
                 </a:extLst>
               </a:tr>
@@ -10366,7 +10450,7 @@
                 </a:tc>
                 <a:extLst>
                   <a:ext uri="{0D108BD9-81ED-4DB2-BD59-A6C34878D82A}">
-                    <a16:rowId xmlns:a16="http://schemas.microsoft.com/office/drawing/2014/main" val="10001"/>
+                    <a16:rowId xmlns:a16="http://schemas.microsoft.com/office/drawing/2014/main" xmlns="" val="10001"/>
                   </a:ext>
                 </a:extLst>
               </a:tr>
@@ -10469,7 +10553,7 @@
                 </a:tc>
                 <a:extLst>
                   <a:ext uri="{0D108BD9-81ED-4DB2-BD59-A6C34878D82A}">
-                    <a16:rowId xmlns:a16="http://schemas.microsoft.com/office/drawing/2014/main" val="10002"/>
+                    <a16:rowId xmlns:a16="http://schemas.microsoft.com/office/drawing/2014/main" xmlns="" val="10002"/>
                   </a:ext>
                 </a:extLst>
               </a:tr>
@@ -10566,7 +10650,7 @@
                 </a:tc>
                 <a:extLst>
                   <a:ext uri="{0D108BD9-81ED-4DB2-BD59-A6C34878D82A}">
-                    <a16:rowId xmlns:a16="http://schemas.microsoft.com/office/drawing/2014/main" val="10003"/>
+                    <a16:rowId xmlns:a16="http://schemas.microsoft.com/office/drawing/2014/main" xmlns="" val="10003"/>
                   </a:ext>
                 </a:extLst>
               </a:tr>
@@ -10603,21 +10687,21 @@
                 <a:gridCol w="889653">
                   <a:extLst>
                     <a:ext uri="{9D8B030D-6E8A-4147-A177-3AD203B41FA5}">
-                      <a16:colId xmlns:a16="http://schemas.microsoft.com/office/drawing/2014/main" val="20000"/>
+                      <a16:colId xmlns:a16="http://schemas.microsoft.com/office/drawing/2014/main" xmlns="" val="20000"/>
                     </a:ext>
                   </a:extLst>
                 </a:gridCol>
                 <a:gridCol w="889653">
                   <a:extLst>
                     <a:ext uri="{9D8B030D-6E8A-4147-A177-3AD203B41FA5}">
-                      <a16:colId xmlns:a16="http://schemas.microsoft.com/office/drawing/2014/main" val="20001"/>
+                      <a16:colId xmlns:a16="http://schemas.microsoft.com/office/drawing/2014/main" xmlns="" val="20001"/>
                     </a:ext>
                   </a:extLst>
                 </a:gridCol>
                 <a:gridCol w="890577">
                   <a:extLst>
                     <a:ext uri="{9D8B030D-6E8A-4147-A177-3AD203B41FA5}">
-                      <a16:colId xmlns:a16="http://schemas.microsoft.com/office/drawing/2014/main" val="20002"/>
+                      <a16:colId xmlns:a16="http://schemas.microsoft.com/office/drawing/2014/main" xmlns="" val="20002"/>
                     </a:ext>
                   </a:extLst>
                 </a:gridCol>
@@ -10721,7 +10805,7 @@
                 </a:tc>
                 <a:extLst>
                   <a:ext uri="{0D108BD9-81ED-4DB2-BD59-A6C34878D82A}">
-                    <a16:rowId xmlns:a16="http://schemas.microsoft.com/office/drawing/2014/main" val="10000"/>
+                    <a16:rowId xmlns:a16="http://schemas.microsoft.com/office/drawing/2014/main" xmlns="" val="10000"/>
                   </a:ext>
                 </a:extLst>
               </a:tr>
@@ -10824,7 +10908,7 @@
                 </a:tc>
                 <a:extLst>
                   <a:ext uri="{0D108BD9-81ED-4DB2-BD59-A6C34878D82A}">
-                    <a16:rowId xmlns:a16="http://schemas.microsoft.com/office/drawing/2014/main" val="10001"/>
+                    <a16:rowId xmlns:a16="http://schemas.microsoft.com/office/drawing/2014/main" xmlns="" val="10001"/>
                   </a:ext>
                 </a:extLst>
               </a:tr>
@@ -10927,7 +11011,7 @@
                 </a:tc>
                 <a:extLst>
                   <a:ext uri="{0D108BD9-81ED-4DB2-BD59-A6C34878D82A}">
-                    <a16:rowId xmlns:a16="http://schemas.microsoft.com/office/drawing/2014/main" val="10002"/>
+                    <a16:rowId xmlns:a16="http://schemas.microsoft.com/office/drawing/2014/main" xmlns="" val="10002"/>
                   </a:ext>
                 </a:extLst>
               </a:tr>
@@ -11018,7 +11102,7 @@
                 </a:tc>
                 <a:extLst>
                   <a:ext uri="{0D108BD9-81ED-4DB2-BD59-A6C34878D82A}">
-                    <a16:rowId xmlns:a16="http://schemas.microsoft.com/office/drawing/2014/main" val="10003"/>
+                    <a16:rowId xmlns:a16="http://schemas.microsoft.com/office/drawing/2014/main" xmlns="" val="10003"/>
                   </a:ext>
                 </a:extLst>
               </a:tr>
@@ -11081,7 +11165,15 @@
             <a:pPr algn="ctr"/>
             <a:r>
               <a:rPr lang="hy-AM" dirty="0" smtClean="0"/>
-              <a:t>Խնդրի դրվածք</a:t>
+              <a:t>Խնդրի </a:t>
+            </a:r>
+            <a:r>
+              <a:rPr lang="hy-AM" dirty="0" smtClean="0"/>
+              <a:t>դրվածք</a:t>
+            </a:r>
+            <a:r>
+              <a:rPr lang="hy-AM" dirty="0"/>
+              <a:t>Ը</a:t>
             </a:r>
             <a:endParaRPr lang="en-US" dirty="0"/>
           </a:p>
@@ -11111,7 +11203,15 @@
           <a:p>
             <a:r>
               <a:rPr lang="hy-AM" dirty="0" smtClean="0"/>
-              <a:t>Ուսումնասիրել պատկերների հետ աշխատանքը։ Ուսումնասիրությունների արդյունքում ստեղծել ծրագիր, որը կտա հետևյալ հնարավորությունները՝</a:t>
+              <a:t>Ուսումնասիրել պատկերների հետ </a:t>
+            </a:r>
+            <a:r>
+              <a:rPr lang="hy-AM" dirty="0" smtClean="0"/>
+              <a:t>աշխատանքը, որի արդյունքում </a:t>
+            </a:r>
+            <a:r>
+              <a:rPr lang="hy-AM" dirty="0" smtClean="0"/>
+              <a:t>ստեղծել ծրագիր, որը կտա հետևյալ հնարավորությունները՝</a:t>
             </a:r>
           </a:p>
           <a:p>
@@ -11121,7 +11221,19 @@
             </a:pPr>
             <a:r>
               <a:rPr lang="hy-AM" dirty="0" smtClean="0"/>
-              <a:t>վերբեռնել պատկերը, և պատկերի վրա կատարել որոշակի փոփոխություններ</a:t>
+              <a:t>վերբեռնել պատկերը, </a:t>
+            </a:r>
+            <a:r>
+              <a:rPr lang="hy-AM" dirty="0" smtClean="0"/>
+              <a:t>որի վրա </a:t>
+            </a:r>
+            <a:r>
+              <a:rPr lang="hy-AM" dirty="0" smtClean="0"/>
+              <a:t>կատարել </a:t>
+            </a:r>
+            <a:r>
+              <a:rPr lang="hy-AM" dirty="0" smtClean="0"/>
+              <a:t>որոշակի փոփոխություններ</a:t>
             </a:r>
             <a:r>
               <a:rPr lang="en-US" dirty="0" smtClean="0"/>
@@ -11141,8 +11253,13 @@
             </a:r>
             <a:r>
               <a:rPr lang="hy-AM" dirty="0" smtClean="0"/>
-              <a:t> և տեսնել արդյունքը նոր պատկերում։</a:t>
-            </a:r>
+              <a:t> և տեսնել արդյունքը նոր </a:t>
+            </a:r>
+            <a:r>
+              <a:rPr lang="hy-AM" dirty="0" smtClean="0"/>
+              <a:t>պատկերում</a:t>
+            </a:r>
+            <a:endParaRPr lang="hy-AM" dirty="0" smtClean="0"/>
           </a:p>
           <a:p>
             <a:pPr marL="285750" indent="-285750">
@@ -11151,7 +11268,19 @@
             </a:pPr>
             <a:r>
               <a:rPr lang="hy-AM" dirty="0" smtClean="0"/>
-              <a:t>մեծացնի և փոքրացնի վերբեռնած պատկերի չափերը</a:t>
+              <a:t>մեծացնել </a:t>
+            </a:r>
+            <a:r>
+              <a:rPr lang="hy-AM" dirty="0" smtClean="0"/>
+              <a:t>և </a:t>
+            </a:r>
+            <a:r>
+              <a:rPr lang="hy-AM" dirty="0" smtClean="0"/>
+              <a:t>փոքրացնել </a:t>
+            </a:r>
+            <a:r>
+              <a:rPr lang="hy-AM" dirty="0" smtClean="0"/>
+              <a:t>վերբեռնած պատկերի չափերը</a:t>
             </a:r>
           </a:p>
           <a:p>
@@ -11161,8 +11290,29 @@
             </a:pPr>
             <a:r>
               <a:rPr lang="hy-AM" dirty="0" smtClean="0"/>
-              <a:t>վերբեռնած պատկերի մեջ հայտնաբերի ուղիղ գծերը, շրջանագծերը,օբյեկտների եզրագծերը, կարողանա առանձնացնել մարդու դեմքը պատկերի վրայից։</a:t>
-            </a:r>
+              <a:t>վերբեռնած պատկերի մեջ </a:t>
+            </a:r>
+            <a:r>
+              <a:rPr lang="hy-AM" dirty="0" smtClean="0"/>
+              <a:t>հայտնաբերել </a:t>
+            </a:r>
+            <a:r>
+              <a:rPr lang="hy-AM" dirty="0" smtClean="0"/>
+              <a:t>ուղիղ գծերը, շրջանագծերը,օբյեկտների եզրագծերը, </a:t>
+            </a:r>
+            <a:r>
+              <a:rPr lang="hy-AM" dirty="0" smtClean="0"/>
+              <a:t>կարողանալ </a:t>
+            </a:r>
+            <a:r>
+              <a:rPr lang="hy-AM" dirty="0" smtClean="0"/>
+              <a:t>առանձնացնել մարդու դեմքը </a:t>
+            </a:r>
+            <a:r>
+              <a:rPr lang="hy-AM" dirty="0" smtClean="0"/>
+              <a:t>պատկերից։</a:t>
+            </a:r>
+            <a:endParaRPr lang="hy-AM" dirty="0" smtClean="0"/>
           </a:p>
         </p:txBody>
       </p:sp>
@@ -11179,9 +11329,136 @@
   <p:timing>
     <p:tnLst>
       <p:par>
-        <p:cTn id="1" dur="indefinite" restart="never" nodeType="tmRoot"/>
+        <p:cTn id="1" dur="indefinite" restart="never" nodeType="tmRoot">
+          <p:childTnLst>
+            <p:seq concurrent="1" nextAc="seek">
+              <p:cTn id="2" dur="indefinite" nodeType="mainSeq">
+                <p:childTnLst>
+                  <p:par>
+                    <p:cTn id="3" fill="hold">
+                      <p:stCondLst>
+                        <p:cond delay="indefinite"/>
+                        <p:cond evt="onBegin" delay="0">
+                          <p:tn val="2"/>
+                        </p:cond>
+                      </p:stCondLst>
+                      <p:childTnLst>
+                        <p:par>
+                          <p:cTn id="4" fill="hold">
+                            <p:stCondLst>
+                              <p:cond delay="0"/>
+                            </p:stCondLst>
+                            <p:childTnLst>
+                              <p:par>
+                                <p:cTn id="5" presetID="10" presetClass="entr" presetSubtype="0" fill="hold" grpId="0" nodeType="afterEffect">
+                                  <p:stCondLst>
+                                    <p:cond delay="0"/>
+                                  </p:stCondLst>
+                                  <p:childTnLst>
+                                    <p:set>
+                                      <p:cBhvr>
+                                        <p:cTn id="6" dur="1" fill="hold">
+                                          <p:stCondLst>
+                                            <p:cond delay="0"/>
+                                          </p:stCondLst>
+                                        </p:cTn>
+                                        <p:tgtEl>
+                                          <p:spTgt spid="2"/>
+                                        </p:tgtEl>
+                                        <p:attrNameLst>
+                                          <p:attrName>style.visibility</p:attrName>
+                                        </p:attrNameLst>
+                                      </p:cBhvr>
+                                      <p:to>
+                                        <p:strVal val="visible"/>
+                                      </p:to>
+                                    </p:set>
+                                    <p:animEffect transition="in" filter="fade">
+                                      <p:cBhvr>
+                                        <p:cTn id="7" dur="500"/>
+                                        <p:tgtEl>
+                                          <p:spTgt spid="2"/>
+                                        </p:tgtEl>
+                                      </p:cBhvr>
+                                    </p:animEffect>
+                                  </p:childTnLst>
+                                </p:cTn>
+                              </p:par>
+                            </p:childTnLst>
+                          </p:cTn>
+                        </p:par>
+                        <p:par>
+                          <p:cTn id="8" fill="hold">
+                            <p:stCondLst>
+                              <p:cond delay="500"/>
+                            </p:stCondLst>
+                            <p:childTnLst>
+                              <p:par>
+                                <p:cTn id="9" presetID="10" presetClass="entr" presetSubtype="0" fill="hold" grpId="0" nodeType="afterEffect">
+                                  <p:stCondLst>
+                                    <p:cond delay="0"/>
+                                  </p:stCondLst>
+                                  <p:childTnLst>
+                                    <p:set>
+                                      <p:cBhvr>
+                                        <p:cTn id="10" dur="1" fill="hold">
+                                          <p:stCondLst>
+                                            <p:cond delay="0"/>
+                                          </p:stCondLst>
+                                        </p:cTn>
+                                        <p:tgtEl>
+                                          <p:spTgt spid="3"/>
+                                        </p:tgtEl>
+                                        <p:attrNameLst>
+                                          <p:attrName>style.visibility</p:attrName>
+                                        </p:attrNameLst>
+                                      </p:cBhvr>
+                                      <p:to>
+                                        <p:strVal val="visible"/>
+                                      </p:to>
+                                    </p:set>
+                                    <p:animEffect transition="in" filter="fade">
+                                      <p:cBhvr>
+                                        <p:cTn id="11" dur="500"/>
+                                        <p:tgtEl>
+                                          <p:spTgt spid="3"/>
+                                        </p:tgtEl>
+                                      </p:cBhvr>
+                                    </p:animEffect>
+                                  </p:childTnLst>
+                                </p:cTn>
+                              </p:par>
+                            </p:childTnLst>
+                          </p:cTn>
+                        </p:par>
+                      </p:childTnLst>
+                    </p:cTn>
+                  </p:par>
+                </p:childTnLst>
+              </p:cTn>
+              <p:prevCondLst>
+                <p:cond evt="onPrev" delay="0">
+                  <p:tgtEl>
+                    <p:sldTgt/>
+                  </p:tgtEl>
+                </p:cond>
+              </p:prevCondLst>
+              <p:nextCondLst>
+                <p:cond evt="onNext" delay="0">
+                  <p:tgtEl>
+                    <p:sldTgt/>
+                  </p:tgtEl>
+                </p:cond>
+              </p:nextCondLst>
+            </p:seq>
+          </p:childTnLst>
+        </p:cTn>
       </p:par>
     </p:tnLst>
+    <p:bldLst>
+      <p:bldP spid="2" grpId="0"/>
+      <p:bldP spid="3" grpId="0"/>
+    </p:bldLst>
   </p:timing>
 </p:sld>
 </file>
@@ -11975,7 +12252,7 @@
         </p:blipFill>
         <p:spPr>
           <a:xfrm>
-            <a:off x="685801" y="2434061"/>
+            <a:off x="1278083" y="2065867"/>
             <a:ext cx="4633807" cy="3353012"/>
           </a:xfrm>
           <a:prstGeom prst="rect">
@@ -12001,7 +12278,7 @@
         </p:blipFill>
         <p:spPr>
           <a:xfrm>
-            <a:off x="6859952" y="2434061"/>
+            <a:off x="6758954" y="2065867"/>
             <a:ext cx="3486772" cy="3353012"/>
           </a:xfrm>
           <a:prstGeom prst="rect">
@@ -12043,6 +12320,9 @@
                     <p:cTn id="3" fill="hold">
                       <p:stCondLst>
                         <p:cond delay="indefinite"/>
+                        <p:cond evt="onBegin" delay="0">
+                          <p:tn val="2"/>
+                        </p:cond>
                       </p:stCondLst>
                       <p:childTnLst>
                         <p:par>
@@ -12052,7 +12332,7 @@
                             </p:stCondLst>
                             <p:childTnLst>
                               <p:par>
-                                <p:cTn id="5" presetID="10" presetClass="entr" presetSubtype="0" fill="hold" nodeType="clickEffect">
+                                <p:cTn id="5" presetID="10" presetClass="entr" presetSubtype="0" fill="hold" nodeType="afterEffect">
                                   <p:stCondLst>
                                     <p:cond delay="0"/>
                                   </p:stCondLst>
@@ -12089,30 +12369,21 @@
                             </p:childTnLst>
                           </p:cTn>
                         </p:par>
-                      </p:childTnLst>
-                    </p:cTn>
-                  </p:par>
-                  <p:par>
-                    <p:cTn id="8" fill="hold">
-                      <p:stCondLst>
-                        <p:cond delay="indefinite"/>
-                      </p:stCondLst>
-                      <p:childTnLst>
                         <p:par>
-                          <p:cTn id="9" fill="hold">
+                          <p:cTn id="8" fill="hold">
                             <p:stCondLst>
-                              <p:cond delay="0"/>
+                              <p:cond delay="500"/>
                             </p:stCondLst>
                             <p:childTnLst>
                               <p:par>
-                                <p:cTn id="10" presetID="2" presetClass="entr" presetSubtype="2" fill="hold" nodeType="clickEffect">
+                                <p:cTn id="9" presetID="2" presetClass="entr" presetSubtype="2" fill="hold" nodeType="afterEffect">
                                   <p:stCondLst>
                                     <p:cond delay="0"/>
                                   </p:stCondLst>
                                   <p:childTnLst>
                                     <p:set>
                                       <p:cBhvr>
-                                        <p:cTn id="11" dur="1" fill="hold">
+                                        <p:cTn id="10" dur="1" fill="hold">
                                           <p:stCondLst>
                                             <p:cond delay="0"/>
                                           </p:stCondLst>
@@ -12130,7 +12401,7 @@
                                     </p:set>
                                     <p:anim calcmode="lin" valueType="num">
                                       <p:cBhvr additive="base">
-                                        <p:cTn id="12" dur="1000" fill="hold"/>
+                                        <p:cTn id="11" dur="1400" fill="hold"/>
                                         <p:tgtEl>
                                           <p:spTgt spid="9"/>
                                         </p:tgtEl>
@@ -12153,7 +12424,7 @@
                                     </p:anim>
                                     <p:anim calcmode="lin" valueType="num">
                                       <p:cBhvr additive="base">
-                                        <p:cTn id="13" dur="1000" fill="hold"/>
+                                        <p:cTn id="12" dur="1400" fill="hold"/>
                                         <p:tgtEl>
                                           <p:spTgt spid="9"/>
                                         </p:tgtEl>
@@ -12297,7 +12568,7 @@
         </p:blipFill>
         <p:spPr>
           <a:xfrm>
-            <a:off x="8074805" y="2951241"/>
+            <a:off x="7960505" y="2427541"/>
             <a:ext cx="3172810" cy="2921000"/>
           </a:xfrm>
         </p:spPr>
@@ -12324,7 +12595,7 @@
         </p:blipFill>
         <p:spPr>
           <a:xfrm>
-            <a:off x="4837267" y="2955396"/>
+            <a:off x="4951567" y="2431696"/>
             <a:ext cx="2916845" cy="2916845"/>
           </a:xfrm>
           <a:prstGeom prst="rect">
@@ -12350,7 +12621,7 @@
         </p:blipFill>
         <p:spPr>
           <a:xfrm>
-            <a:off x="821450" y="2951241"/>
+            <a:off x="685801" y="2431696"/>
             <a:ext cx="3405349" cy="2921000"/>
           </a:xfrm>
           <a:prstGeom prst="rect">
@@ -12380,6 +12651,9 @@
                     <p:cTn id="3" fill="hold">
                       <p:stCondLst>
                         <p:cond delay="indefinite"/>
+                        <p:cond evt="onBegin" delay="0">
+                          <p:tn val="2"/>
+                        </p:cond>
                       </p:stCondLst>
                       <p:childTnLst>
                         <p:par>
@@ -12389,7 +12663,7 @@
                             </p:stCondLst>
                             <p:childTnLst>
                               <p:par>
-                                <p:cTn id="5" presetID="10" presetClass="entr" presetSubtype="0" fill="hold" nodeType="clickEffect">
+                                <p:cTn id="5" presetID="10" presetClass="entr" presetSubtype="0" fill="hold" nodeType="afterEffect">
                                   <p:stCondLst>
                                     <p:cond delay="0"/>
                                   </p:stCondLst>
@@ -12426,30 +12700,21 @@
                             </p:childTnLst>
                           </p:cTn>
                         </p:par>
-                      </p:childTnLst>
-                    </p:cTn>
-                  </p:par>
-                  <p:par>
-                    <p:cTn id="8" fill="hold">
-                      <p:stCondLst>
-                        <p:cond delay="indefinite"/>
-                      </p:stCondLst>
-                      <p:childTnLst>
                         <p:par>
-                          <p:cTn id="9" fill="hold">
+                          <p:cTn id="8" fill="hold">
                             <p:stCondLst>
-                              <p:cond delay="0"/>
+                              <p:cond delay="500"/>
                             </p:stCondLst>
                             <p:childTnLst>
                               <p:par>
-                                <p:cTn id="10" presetID="42" presetClass="entr" presetSubtype="0" fill="hold" nodeType="clickEffect">
+                                <p:cTn id="9" presetID="42" presetClass="entr" presetSubtype="0" fill="hold" nodeType="afterEffect">
                                   <p:stCondLst>
-                                    <p:cond delay="0"/>
+                                    <p:cond delay="600"/>
                                   </p:stCondLst>
                                   <p:childTnLst>
                                     <p:set>
                                       <p:cBhvr>
-                                        <p:cTn id="11" dur="1" fill="hold">
+                                        <p:cTn id="10" dur="1" fill="hold">
                                           <p:stCondLst>
                                             <p:cond delay="0"/>
                                           </p:stCondLst>
@@ -12467,7 +12732,7 @@
                                     </p:set>
                                     <p:animEffect transition="in" filter="fade">
                                       <p:cBhvr>
-                                        <p:cTn id="12" dur="1000"/>
+                                        <p:cTn id="11" dur="1000"/>
                                         <p:tgtEl>
                                           <p:spTgt spid="8"/>
                                         </p:tgtEl>
@@ -12475,7 +12740,7 @@
                                     </p:animEffect>
                                     <p:anim calcmode="lin" valueType="num">
                                       <p:cBhvr>
-                                        <p:cTn id="13" dur="1000" fill="hold"/>
+                                        <p:cTn id="12" dur="1000" fill="hold"/>
                                         <p:tgtEl>
                                           <p:spTgt spid="8"/>
                                         </p:tgtEl>
@@ -12498,7 +12763,7 @@
                                     </p:anim>
                                     <p:anim calcmode="lin" valueType="num">
                                       <p:cBhvr>
-                                        <p:cTn id="14" dur="1000" fill="hold"/>
+                                        <p:cTn id="13" dur="1000" fill="hold"/>
                                         <p:tgtEl>
                                           <p:spTgt spid="8"/>
                                         </p:tgtEl>
@@ -12522,8 +12787,17 @@
                                   </p:childTnLst>
                                 </p:cTn>
                               </p:par>
+                            </p:childTnLst>
+                          </p:cTn>
+                        </p:par>
+                        <p:par>
+                          <p:cTn id="14" fill="hold">
+                            <p:stCondLst>
+                              <p:cond delay="2100"/>
+                            </p:stCondLst>
+                            <p:childTnLst>
                               <p:par>
-                                <p:cTn id="15" presetID="42" presetClass="entr" presetSubtype="0" fill="hold" nodeType="withEffect">
+                                <p:cTn id="15" presetID="42" presetClass="entr" presetSubtype="0" fill="hold" nodeType="afterEffect">
                                   <p:stCondLst>
                                     <p:cond delay="0"/>
                                   </p:stCondLst>
@@ -12727,7 +13001,7 @@
         </p:blipFill>
         <p:spPr>
           <a:xfrm>
-            <a:off x="6898544" y="4619751"/>
+            <a:off x="6825807" y="4619751"/>
             <a:ext cx="2410414" cy="2238249"/>
           </a:xfrm>
         </p:spPr>
@@ -12837,7 +13111,7 @@
         </p:blipFill>
         <p:spPr>
           <a:xfrm>
-            <a:off x="6476178" y="2226734"/>
+            <a:off x="6445005" y="2226734"/>
             <a:ext cx="1995145" cy="2372360"/>
           </a:xfrm>
         </p:spPr>
@@ -13695,14 +13969,14 @@
                 <a:gridCol w="2881313">
                   <a:extLst>
                     <a:ext uri="{9D8B030D-6E8A-4147-A177-3AD203B41FA5}">
-                      <a16:colId xmlns:a16="http://schemas.microsoft.com/office/drawing/2014/main" val="3318161435"/>
+                      <a16:colId xmlns:a16="http://schemas.microsoft.com/office/drawing/2014/main" xmlns="" val="3318161435"/>
                     </a:ext>
                   </a:extLst>
                 </a:gridCol>
                 <a:gridCol w="2881313">
                   <a:extLst>
                     <a:ext uri="{9D8B030D-6E8A-4147-A177-3AD203B41FA5}">
-                      <a16:colId xmlns:a16="http://schemas.microsoft.com/office/drawing/2014/main" val="4127245324"/>
+                      <a16:colId xmlns:a16="http://schemas.microsoft.com/office/drawing/2014/main" xmlns="" val="4127245324"/>
                     </a:ext>
                   </a:extLst>
                 </a:gridCol>
@@ -13779,7 +14053,7 @@
                 </a:tc>
                 <a:extLst>
                   <a:ext uri="{0D108BD9-81ED-4DB2-BD59-A6C34878D82A}">
-                    <a16:rowId xmlns:a16="http://schemas.microsoft.com/office/drawing/2014/main" val="2750261522"/>
+                    <a16:rowId xmlns:a16="http://schemas.microsoft.com/office/drawing/2014/main" xmlns="" val="2750261522"/>
                   </a:ext>
                 </a:extLst>
               </a:tr>

</xml_diff>

<commit_message>
adding diploma and presentation new versions
</commit_message>
<xml_diff>
--- a/presentation/Presentation.pptx
+++ b/presentation/Presentation.pptx
@@ -2913,11 +2913,11 @@
           <c:showPercent val="0"/>
           <c:showBubbleSize val="0"/>
         </c:dLbls>
-        <c:axId val="-336008592"/>
-        <c:axId val="-336008048"/>
+        <c:axId val="1700614000"/>
+        <c:axId val="1700613456"/>
       </c:scatterChart>
       <c:valAx>
-        <c:axId val="-336008592"/>
+        <c:axId val="1700614000"/>
         <c:scaling>
           <c:orientation val="minMax"/>
         </c:scaling>
@@ -2927,12 +2927,12 @@
         <c:majorTickMark val="none"/>
         <c:minorTickMark val="none"/>
         <c:tickLblPos val="nextTo"/>
-        <c:crossAx val="-336008048"/>
+        <c:crossAx val="1700613456"/>
         <c:crosses val="autoZero"/>
         <c:crossBetween val="midCat"/>
       </c:valAx>
       <c:valAx>
-        <c:axId val="-336008048"/>
+        <c:axId val="1700613456"/>
         <c:scaling>
           <c:orientation val="minMax"/>
         </c:scaling>
@@ -2942,7 +2942,7 @@
         <c:majorTickMark val="none"/>
         <c:minorTickMark val="none"/>
         <c:tickLblPos val="nextTo"/>
-        <c:crossAx val="-336008592"/>
+        <c:crossAx val="1700614000"/>
         <c:crosses val="autoZero"/>
         <c:crossBetween val="midCat"/>
       </c:valAx>
@@ -5663,11 +5663,11 @@
           <c:showPercent val="0"/>
           <c:showBubbleSize val="0"/>
         </c:dLbls>
-        <c:axId val="-458312624"/>
-        <c:axId val="-458309904"/>
+        <c:axId val="1700616720"/>
+        <c:axId val="1700615088"/>
       </c:scatterChart>
       <c:valAx>
-        <c:axId val="-458312624"/>
+        <c:axId val="1700616720"/>
         <c:scaling>
           <c:orientation val="minMax"/>
         </c:scaling>
@@ -5677,12 +5677,12 @@
         <c:majorTickMark val="none"/>
         <c:minorTickMark val="none"/>
         <c:tickLblPos val="nextTo"/>
-        <c:crossAx val="-458309904"/>
+        <c:crossAx val="1700615088"/>
         <c:crosses val="autoZero"/>
         <c:crossBetween val="midCat"/>
       </c:valAx>
       <c:valAx>
-        <c:axId val="-458309904"/>
+        <c:axId val="1700615088"/>
         <c:scaling>
           <c:orientation val="minMax"/>
         </c:scaling>
@@ -5692,7 +5692,7 @@
         <c:majorTickMark val="none"/>
         <c:minorTickMark val="none"/>
         <c:tickLblPos val="nextTo"/>
-        <c:crossAx val="-458312624"/>
+        <c:crossAx val="1700616720"/>
         <c:crosses val="autoZero"/>
         <c:crossBetween val="midCat"/>
       </c:valAx>
@@ -8511,11 +8511,11 @@
           <c:showPercent val="0"/>
           <c:showBubbleSize val="0"/>
         </c:dLbls>
-        <c:axId val="-336635952"/>
-        <c:axId val="-336642480"/>
+        <c:axId val="1696140496"/>
+        <c:axId val="1696137776"/>
       </c:scatterChart>
       <c:valAx>
-        <c:axId val="-336635952"/>
+        <c:axId val="1696140496"/>
         <c:scaling>
           <c:orientation val="minMax"/>
         </c:scaling>
@@ -8525,12 +8525,12 @@
         <c:majorTickMark val="none"/>
         <c:minorTickMark val="none"/>
         <c:tickLblPos val="nextTo"/>
-        <c:crossAx val="-336642480"/>
+        <c:crossAx val="1696137776"/>
         <c:crosses val="autoZero"/>
         <c:crossBetween val="midCat"/>
       </c:valAx>
       <c:valAx>
-        <c:axId val="-336642480"/>
+        <c:axId val="1696137776"/>
         <c:scaling>
           <c:orientation val="minMax"/>
         </c:scaling>
@@ -8540,7 +8540,7 @@
         <c:majorTickMark val="none"/>
         <c:minorTickMark val="none"/>
         <c:tickLblPos val="nextTo"/>
-        <c:crossAx val="-336635952"/>
+        <c:crossAx val="1696140496"/>
         <c:crosses val="autoZero"/>
         <c:crossBetween val="midCat"/>
       </c:valAx>
@@ -11261,11 +11261,11 @@
           <c:showPercent val="0"/>
           <c:showBubbleSize val="0"/>
         </c:dLbls>
-        <c:axId val="-369393456"/>
-        <c:axId val="-369392912"/>
+        <c:axId val="1697428960"/>
+        <c:axId val="1697425696"/>
       </c:scatterChart>
       <c:valAx>
-        <c:axId val="-369393456"/>
+        <c:axId val="1697428960"/>
         <c:scaling>
           <c:orientation val="minMax"/>
         </c:scaling>
@@ -11275,12 +11275,12 @@
         <c:majorTickMark val="none"/>
         <c:minorTickMark val="none"/>
         <c:tickLblPos val="nextTo"/>
-        <c:crossAx val="-369392912"/>
+        <c:crossAx val="1697425696"/>
         <c:crosses val="autoZero"/>
         <c:crossBetween val="midCat"/>
       </c:valAx>
       <c:valAx>
-        <c:axId val="-369392912"/>
+        <c:axId val="1697425696"/>
         <c:scaling>
           <c:orientation val="minMax"/>
         </c:scaling>
@@ -11290,7 +11290,7 @@
         <c:majorTickMark val="none"/>
         <c:minorTickMark val="none"/>
         <c:tickLblPos val="nextTo"/>
-        <c:crossAx val="-369393456"/>
+        <c:crossAx val="1697428960"/>
         <c:crosses val="autoZero"/>
         <c:crossBetween val="midCat"/>
       </c:valAx>
@@ -21670,8 +21670,8 @@
           </a:p>
         </p:txBody>
       </p:sp>
-      <mc:AlternateContent xmlns:mc="http://schemas.openxmlformats.org/markup-compatibility/2006">
-        <mc:Choice xmlns:a14="http://schemas.microsoft.com/office/drawing/2010/main" Requires="a14">
+      <mc:AlternateContent xmlns:mc="http://schemas.openxmlformats.org/markup-compatibility/2006" xmlns:a14="http://schemas.microsoft.com/office/drawing/2010/main">
+        <mc:Choice Requires="a14">
           <p:sp>
             <p:nvSpPr>
               <p:cNvPr id="55" name="TextBox 54"/>
@@ -21694,6 +21694,7 @@
               </a:bodyPr>
               <a:lstStyle/>
               <a:p>
+                <a:pPr/>
                 <a14:m>
                   <m:oMathPara xmlns:m="http://schemas.openxmlformats.org/officeDocument/2006/math">
                     <m:oMathParaPr>
@@ -21759,7 +21760,7 @@
             </p:txBody>
           </p:sp>
         </mc:Choice>
-        <mc:Fallback>
+        <mc:Fallback xmlns="">
           <p:sp>
             <p:nvSpPr>
               <p:cNvPr id="55" name="TextBox 54"/>
@@ -21798,8 +21799,8 @@
           </p:sp>
         </mc:Fallback>
       </mc:AlternateContent>
-      <mc:AlternateContent xmlns:mc="http://schemas.openxmlformats.org/markup-compatibility/2006">
-        <mc:Choice xmlns:a14="http://schemas.microsoft.com/office/drawing/2010/main" Requires="a14">
+      <mc:AlternateContent xmlns:mc="http://schemas.openxmlformats.org/markup-compatibility/2006" xmlns:a14="http://schemas.microsoft.com/office/drawing/2010/main">
+        <mc:Choice Requires="a14">
           <p:sp>
             <p:nvSpPr>
               <p:cNvPr id="56" name="Rectangle 55"/>
@@ -22017,7 +22018,7 @@
             </p:txBody>
           </p:sp>
         </mc:Choice>
-        <mc:Fallback>
+        <mc:Fallback xmlns="">
           <p:sp>
             <p:nvSpPr>
               <p:cNvPr id="56" name="Rectangle 55"/>
@@ -22092,8 +22093,8 @@
           </a:fontRef>
         </p:style>
       </p:cxnSp>
-      <mc:AlternateContent xmlns:mc="http://schemas.openxmlformats.org/markup-compatibility/2006">
-        <mc:Choice xmlns:a14="http://schemas.microsoft.com/office/drawing/2010/main" Requires="a14">
+      <mc:AlternateContent xmlns:mc="http://schemas.openxmlformats.org/markup-compatibility/2006" xmlns:a14="http://schemas.microsoft.com/office/drawing/2010/main">
+        <mc:Choice Requires="a14">
           <p:sp>
             <p:nvSpPr>
               <p:cNvPr id="58" name="Rectangle 57"/>
@@ -22304,7 +22305,7 @@
             </p:txBody>
           </p:sp>
         </mc:Choice>
-        <mc:Fallback>
+        <mc:Fallback xmlns="">
           <p:sp>
             <p:nvSpPr>
               <p:cNvPr id="58" name="Rectangle 57"/>
@@ -22433,8 +22434,8 @@
           </a:p>
         </p:txBody>
       </p:sp>
-      <mc:AlternateContent xmlns:mc="http://schemas.openxmlformats.org/markup-compatibility/2006">
-        <mc:Choice xmlns:a14="http://schemas.microsoft.com/office/drawing/2010/main" Requires="a14">
+      <mc:AlternateContent xmlns:mc="http://schemas.openxmlformats.org/markup-compatibility/2006" xmlns:a14="http://schemas.microsoft.com/office/drawing/2010/main">
+        <mc:Choice Requires="a14">
           <p:sp>
             <p:nvSpPr>
               <p:cNvPr id="61" name="TextBox 60"/>
@@ -22457,6 +22458,7 @@
               </a:bodyPr>
               <a:lstStyle/>
               <a:p>
+                <a:pPr/>
                 <a14:m>
                   <m:oMathPara xmlns:m="http://schemas.openxmlformats.org/officeDocument/2006/math">
                     <m:oMathParaPr>
@@ -22514,7 +22516,7 @@
             </p:txBody>
           </p:sp>
         </mc:Choice>
-        <mc:Fallback>
+        <mc:Fallback xmlns="">
           <p:sp>
             <p:nvSpPr>
               <p:cNvPr id="61" name="TextBox 60"/>
@@ -23994,35 +23996,35 @@
                     <a:gridCol w="999490">
                       <a:extLst>
                         <a:ext uri="{9D8B030D-6E8A-4147-A177-3AD203B41FA5}">
-                          <a16:colId xmlns="" xmlns:a16="http://schemas.microsoft.com/office/drawing/2014/main" val="1216725777"/>
+                          <a16:colId xmlns:a16="http://schemas.microsoft.com/office/drawing/2014/main" xmlns="" val="1216725777"/>
                         </a:ext>
                       </a:extLst>
                     </a:gridCol>
                     <a:gridCol w="999490">
                       <a:extLst>
                         <a:ext uri="{9D8B030D-6E8A-4147-A177-3AD203B41FA5}">
-                          <a16:colId xmlns="" xmlns:a16="http://schemas.microsoft.com/office/drawing/2014/main" val="1506238522"/>
+                          <a16:colId xmlns:a16="http://schemas.microsoft.com/office/drawing/2014/main" xmlns="" val="1506238522"/>
                         </a:ext>
                       </a:extLst>
                     </a:gridCol>
                     <a:gridCol w="999490">
                       <a:extLst>
                         <a:ext uri="{9D8B030D-6E8A-4147-A177-3AD203B41FA5}">
-                          <a16:colId xmlns="" xmlns:a16="http://schemas.microsoft.com/office/drawing/2014/main" val="2836820485"/>
+                          <a16:colId xmlns:a16="http://schemas.microsoft.com/office/drawing/2014/main" xmlns="" val="2836820485"/>
                         </a:ext>
                       </a:extLst>
                     </a:gridCol>
                     <a:gridCol w="999490">
                       <a:extLst>
                         <a:ext uri="{9D8B030D-6E8A-4147-A177-3AD203B41FA5}">
-                          <a16:colId xmlns="" xmlns:a16="http://schemas.microsoft.com/office/drawing/2014/main" val="1651784423"/>
+                          <a16:colId xmlns:a16="http://schemas.microsoft.com/office/drawing/2014/main" xmlns="" val="1651784423"/>
                         </a:ext>
                       </a:extLst>
                     </a:gridCol>
                     <a:gridCol w="999490">
                       <a:extLst>
                         <a:ext uri="{9D8B030D-6E8A-4147-A177-3AD203B41FA5}">
-                          <a16:colId xmlns="" xmlns:a16="http://schemas.microsoft.com/office/drawing/2014/main" val="1257235431"/>
+                          <a16:colId xmlns:a16="http://schemas.microsoft.com/office/drawing/2014/main" xmlns="" val="1257235431"/>
                         </a:ext>
                       </a:extLst>
                     </a:gridCol>
@@ -24343,7 +24345,7 @@
                     </a:tc>
                     <a:extLst>
                       <a:ext uri="{0D108BD9-81ED-4DB2-BD59-A6C34878D82A}">
-                        <a16:rowId xmlns="" xmlns:a16="http://schemas.microsoft.com/office/drawing/2014/main" val="1324942624"/>
+                        <a16:rowId xmlns:a16="http://schemas.microsoft.com/office/drawing/2014/main" xmlns="" val="1324942624"/>
                       </a:ext>
                     </a:extLst>
                   </a:tr>
@@ -24531,7 +24533,7 @@
                     </a:tc>
                     <a:extLst>
                       <a:ext uri="{0D108BD9-81ED-4DB2-BD59-A6C34878D82A}">
-                        <a16:rowId xmlns="" xmlns:a16="http://schemas.microsoft.com/office/drawing/2014/main" val="2491110305"/>
+                        <a16:rowId xmlns:a16="http://schemas.microsoft.com/office/drawing/2014/main" xmlns="" val="2491110305"/>
                       </a:ext>
                     </a:extLst>
                   </a:tr>
@@ -24719,7 +24721,7 @@
                     </a:tc>
                     <a:extLst>
                       <a:ext uri="{0D108BD9-81ED-4DB2-BD59-A6C34878D82A}">
-                        <a16:rowId xmlns="" xmlns:a16="http://schemas.microsoft.com/office/drawing/2014/main" val="1031351399"/>
+                        <a16:rowId xmlns:a16="http://schemas.microsoft.com/office/drawing/2014/main" xmlns="" val="1031351399"/>
                       </a:ext>
                     </a:extLst>
                   </a:tr>
@@ -24907,7 +24909,7 @@
                     </a:tc>
                     <a:extLst>
                       <a:ext uri="{0D108BD9-81ED-4DB2-BD59-A6C34878D82A}">
-                        <a16:rowId xmlns="" xmlns:a16="http://schemas.microsoft.com/office/drawing/2014/main" val="1041437350"/>
+                        <a16:rowId xmlns:a16="http://schemas.microsoft.com/office/drawing/2014/main" xmlns="" val="1041437350"/>
                       </a:ext>
                     </a:extLst>
                   </a:tr>
@@ -25095,7 +25097,7 @@
                     </a:tc>
                     <a:extLst>
                       <a:ext uri="{0D108BD9-81ED-4DB2-BD59-A6C34878D82A}">
-                        <a16:rowId xmlns="" xmlns:a16="http://schemas.microsoft.com/office/drawing/2014/main" val="2051532882"/>
+                        <a16:rowId xmlns:a16="http://schemas.microsoft.com/office/drawing/2014/main" xmlns="" val="2051532882"/>
                       </a:ext>
                     </a:extLst>
                   </a:tr>
@@ -25283,7 +25285,7 @@
                     </a:tc>
                     <a:extLst>
                       <a:ext uri="{0D108BD9-81ED-4DB2-BD59-A6C34878D82A}">
-                        <a16:rowId xmlns="" xmlns:a16="http://schemas.microsoft.com/office/drawing/2014/main" val="4146497862"/>
+                        <a16:rowId xmlns:a16="http://schemas.microsoft.com/office/drawing/2014/main" xmlns="" val="4146497862"/>
                       </a:ext>
                     </a:extLst>
                   </a:tr>
@@ -25374,7 +25376,7 @@
                     </a:tc>
                     <a:extLst>
                       <a:ext uri="{0D108BD9-81ED-4DB2-BD59-A6C34878D82A}">
-                        <a16:rowId xmlns="" xmlns:a16="http://schemas.microsoft.com/office/drawing/2014/main" val="766546503"/>
+                        <a16:rowId xmlns:a16="http://schemas.microsoft.com/office/drawing/2014/main" xmlns="" val="766546503"/>
                       </a:ext>
                     </a:extLst>
                   </a:tr>
@@ -27214,7 +27216,7 @@
         <p:spPr>
           <a:xfrm>
             <a:off x="1215736" y="2504209"/>
-            <a:ext cx="9601490" cy="2308324"/>
+            <a:ext cx="9601490" cy="1754326"/>
           </a:xfrm>
           <a:prstGeom prst="rect">
             <a:avLst/>
@@ -27229,7 +27231,23 @@
           <a:p>
             <a:r>
               <a:rPr lang="hy-AM" dirty="0" smtClean="0"/>
-              <a:t>Կազմվեց ծրագիր, որը հնարավորություն է տալիս վերբեռնել պատկերը</a:t>
+              <a:t>Մշակվեց </a:t>
+            </a:r>
+            <a:r>
+              <a:rPr lang="hy-AM" dirty="0" smtClean="0"/>
+              <a:t>ծրագիր</a:t>
+            </a:r>
+            <a:r>
+              <a:rPr lang="hy-AM" dirty="0" smtClean="0"/>
+              <a:t>, </a:t>
+            </a:r>
+            <a:r>
+              <a:rPr lang="hy-AM" dirty="0" smtClean="0"/>
+              <a:t>որում կա հնարավորություն բեռնել </a:t>
+            </a:r>
+            <a:r>
+              <a:rPr lang="hy-AM" dirty="0" smtClean="0"/>
+              <a:t>պատկերը</a:t>
             </a:r>
             <a:r>
               <a:rPr lang="en-US" dirty="0" smtClean="0"/>
@@ -27237,45 +27255,75 @@
             </a:r>
             <a:r>
               <a:rPr lang="hy-AM" dirty="0" smtClean="0"/>
-              <a:t>նրա վրա կատարել որոշակի փոփոխություններ</a:t>
+              <a:t>նրա վրա կատարել որոշակի </a:t>
             </a:r>
             <a:r>
-              <a:rPr lang="en-US" dirty="0"/>
+              <a:rPr lang="hy-AM" dirty="0" smtClean="0"/>
+              <a:t>փոփոխություններ </a:t>
+            </a:r>
+            <a:r>
+              <a:rPr lang="en-US" dirty="0" smtClean="0"/>
               <a:t>(</a:t>
             </a:r>
             <a:r>
               <a:rPr lang="hy-AM" dirty="0"/>
-              <a:t>իրագործել որոշակի ալգորիթմներ օգտագործողի մուտքագրած արժեքներով</a:t>
+              <a:t>իրագործել որոշակի ալգորիթմներ օգտագործողի մուտքագրած </a:t>
             </a:r>
             <a:r>
-              <a:rPr lang="en-US" dirty="0"/>
+              <a:rPr lang="hy-AM" dirty="0" smtClean="0"/>
+              <a:t>արգումենտներով</a:t>
+            </a:r>
+            <a:r>
+              <a:rPr lang="en-US" dirty="0" smtClean="0"/>
               <a:t>)</a:t>
             </a:r>
             <a:r>
-              <a:rPr lang="hy-AM" dirty="0"/>
-              <a:t> և տեսնել արդյունքը նոր </a:t>
+              <a:rPr lang="hy-AM" dirty="0" smtClean="0"/>
+              <a:t>։ </a:t>
             </a:r>
             <a:r>
               <a:rPr lang="hy-AM" dirty="0" smtClean="0"/>
-              <a:t>պատկերում։ Հնարավորություն է տրվում վերբեռնած պատկերի չափերը փոփոխելու, որպիսի հետագայում պատկերները պահպանելուց հիշողությունից շատ տարածք չպահանջվի։ Ծրագիրը կարողանում է վերբեռնած </a:t>
+              <a:t>Կարող ենք պատկերի չափերը փոփոխել</a:t>
+            </a:r>
+            <a:r>
+              <a:rPr lang="en-US" dirty="0" smtClean="0"/>
+              <a:t> (</a:t>
+            </a:r>
+            <a:r>
+              <a:rPr lang="hy-AM" dirty="0" smtClean="0"/>
+              <a:t>մեծացնել,փոքրացնել</a:t>
+            </a:r>
+            <a:r>
+              <a:rPr lang="en-US" dirty="0" smtClean="0"/>
+              <a:t>)</a:t>
+            </a:r>
+            <a:r>
+              <a:rPr lang="hy-AM" dirty="0" smtClean="0"/>
+              <a:t>, նրա մեջ </a:t>
             </a:r>
             <a:r>
               <a:rPr lang="hy-AM" dirty="0"/>
-              <a:t>պատկերի մեջ հայտնաբերել ուղիղ գծերը, շրջանագծերը,օբյեկտների եզրագծերը, </a:t>
+              <a:t>հայտնաբերել ուղիղ գծերը, </a:t>
             </a:r>
             <a:r>
               <a:rPr lang="hy-AM" dirty="0" smtClean="0"/>
-              <a:t>առանձնացնել </a:t>
+              <a:t>շրջանագծերը, օբյեկտների եզրագծերը</a:t>
             </a:r>
             <a:r>
               <a:rPr lang="hy-AM" dirty="0"/>
-              <a:t>մարդու դեմքը պատկերից։</a:t>
+              <a:t>։ </a:t>
             </a:r>
-          </a:p>
-          <a:p>
             <a:r>
               <a:rPr lang="hy-AM" dirty="0" smtClean="0"/>
+              <a:t>Ֆոտոխցիկից</a:t>
+            </a:r>
+            <a:r>
+              <a:rPr lang="en-US" dirty="0" smtClean="0"/>
               <a:t> </a:t>
+            </a:r>
+            <a:r>
+              <a:rPr lang="hy-AM" dirty="0" smtClean="0"/>
+              <a:t>կարողանում է առանձնացնել մարդու դեմքը և քառակուսու մեջ է վերցնում։</a:t>
             </a:r>
             <a:endParaRPr lang="en-US" dirty="0"/>
           </a:p>
@@ -27603,8 +27651,8 @@
           </a:p>
         </p:txBody>
       </p:sp>
-      <mc:AlternateContent xmlns:mc="http://schemas.openxmlformats.org/markup-compatibility/2006">
-        <mc:Choice xmlns:a14="http://schemas.microsoft.com/office/drawing/2010/main" Requires="a14">
+      <mc:AlternateContent xmlns:mc="http://schemas.openxmlformats.org/markup-compatibility/2006" xmlns:a14="http://schemas.microsoft.com/office/drawing/2010/main">
+        <mc:Choice Requires="a14">
           <p:sp>
             <p:nvSpPr>
               <p:cNvPr id="24" name="TextBox 23"/>
@@ -27627,6 +27675,7 @@
               </a:bodyPr>
               <a:lstStyle/>
               <a:p>
+                <a:pPr/>
                 <a14:m>
                   <m:oMathPara xmlns:m="http://schemas.openxmlformats.org/officeDocument/2006/math">
                     <m:oMathParaPr>
@@ -27692,7 +27741,7 @@
             </p:txBody>
           </p:sp>
         </mc:Choice>
-        <mc:Fallback>
+        <mc:Fallback xmlns="">
           <p:sp>
             <p:nvSpPr>
               <p:cNvPr id="24" name="TextBox 23"/>
@@ -27731,8 +27780,8 @@
           </p:sp>
         </mc:Fallback>
       </mc:AlternateContent>
-      <mc:AlternateContent xmlns:mc="http://schemas.openxmlformats.org/markup-compatibility/2006">
-        <mc:Choice xmlns:a14="http://schemas.microsoft.com/office/drawing/2010/main" Requires="a14">
+      <mc:AlternateContent xmlns:mc="http://schemas.openxmlformats.org/markup-compatibility/2006" xmlns:a14="http://schemas.microsoft.com/office/drawing/2010/main">
+        <mc:Choice Requires="a14">
           <p:sp>
             <p:nvSpPr>
               <p:cNvPr id="25" name="Rectangle 24"/>
@@ -27950,7 +27999,7 @@
             </p:txBody>
           </p:sp>
         </mc:Choice>
-        <mc:Fallback>
+        <mc:Fallback xmlns="">
           <p:sp>
             <p:nvSpPr>
               <p:cNvPr id="25" name="Rectangle 24"/>
@@ -28025,8 +28074,8 @@
           </a:fontRef>
         </p:style>
       </p:cxnSp>
-      <mc:AlternateContent xmlns:mc="http://schemas.openxmlformats.org/markup-compatibility/2006">
-        <mc:Choice xmlns:a14="http://schemas.microsoft.com/office/drawing/2010/main" Requires="a14">
+      <mc:AlternateContent xmlns:mc="http://schemas.openxmlformats.org/markup-compatibility/2006" xmlns:a14="http://schemas.microsoft.com/office/drawing/2010/main">
+        <mc:Choice Requires="a14">
           <p:sp>
             <p:nvSpPr>
               <p:cNvPr id="28" name="Rectangle 27"/>
@@ -28237,7 +28286,7 @@
             </p:txBody>
           </p:sp>
         </mc:Choice>
-        <mc:Fallback>
+        <mc:Fallback xmlns="">
           <p:sp>
             <p:nvSpPr>
               <p:cNvPr id="28" name="Rectangle 27"/>
@@ -28366,8 +28415,8 @@
           </a:p>
         </p:txBody>
       </p:sp>
-      <mc:AlternateContent xmlns:mc="http://schemas.openxmlformats.org/markup-compatibility/2006">
-        <mc:Choice xmlns:a14="http://schemas.microsoft.com/office/drawing/2010/main" Requires="a14">
+      <mc:AlternateContent xmlns:mc="http://schemas.openxmlformats.org/markup-compatibility/2006" xmlns:a14="http://schemas.microsoft.com/office/drawing/2010/main">
+        <mc:Choice Requires="a14">
           <p:sp>
             <p:nvSpPr>
               <p:cNvPr id="32" name="TextBox 31"/>
@@ -28390,6 +28439,7 @@
               </a:bodyPr>
               <a:lstStyle/>
               <a:p>
+                <a:pPr/>
                 <a14:m>
                   <m:oMathPara xmlns:m="http://schemas.openxmlformats.org/officeDocument/2006/math">
                     <m:oMathParaPr>
@@ -28447,7 +28497,7 @@
             </p:txBody>
           </p:sp>
         </mc:Choice>
-        <mc:Fallback>
+        <mc:Fallback xmlns="">
           <p:sp>
             <p:nvSpPr>
               <p:cNvPr id="32" name="TextBox 31"/>
@@ -28575,17 +28625,8 @@
           <a:p>
             <a:r>
               <a:rPr lang="hy-AM" sz="2400" dirty="0" smtClean="0"/>
-              <a:t>Ուսումնասիրել պատկերների հետ աշխատանքը, որի արդյունքում ստեղծել ծրագիր, որը կտա պատկերը բեռնելու և </a:t>
+              <a:t>Ուսումնասիրել պատկերների հետ աշխատանքը, որի արդյունքում ստեղծել ծրագիր, որը կտա պատկերը բեռնելու և նրա վրա իրականացնելու հետևյալ գործողությունները՝</a:t>
             </a:r>
-            <a:r>
-              <a:rPr lang="hy-AM" sz="2400" dirty="0" smtClean="0"/>
-              <a:t>նրա վրա իրականացնելու հետևյալ գործողությունները</a:t>
-            </a:r>
-            <a:r>
-              <a:rPr lang="hy-AM" sz="2400" dirty="0" smtClean="0"/>
-              <a:t>՝</a:t>
-            </a:r>
-            <a:endParaRPr lang="hy-AM" sz="2400" dirty="0" smtClean="0"/>
           </a:p>
           <a:p>
             <a:pPr marL="285750" indent="-285750">
@@ -28594,11 +28635,7 @@
             </a:pPr>
             <a:r>
               <a:rPr lang="hy-AM" sz="2400" dirty="0" smtClean="0"/>
-              <a:t>կատարել </a:t>
-            </a:r>
-            <a:r>
-              <a:rPr lang="hy-AM" sz="2400" dirty="0" smtClean="0"/>
-              <a:t>որոշակի փոփոխություններ</a:t>
+              <a:t>կատարել որոշակի փոփոխություններ</a:t>
             </a:r>
             <a:r>
               <a:rPr lang="en-US" sz="2400" dirty="0" smtClean="0"/>
@@ -28632,15 +28669,7 @@
             </a:pPr>
             <a:r>
               <a:rPr lang="hy-AM" sz="2400" dirty="0" smtClean="0"/>
-              <a:t>մեծացնել և փոքրացնել </a:t>
-            </a:r>
-            <a:r>
-              <a:rPr lang="hy-AM" sz="2400" dirty="0" smtClean="0"/>
-              <a:t>պատկերի </a:t>
-            </a:r>
-            <a:r>
-              <a:rPr lang="hy-AM" sz="2400" dirty="0" smtClean="0"/>
-              <a:t>չափերը</a:t>
+              <a:t>մեծացնել և փոքրացնել պատկերի չափերը</a:t>
             </a:r>
           </a:p>
           <a:p>
@@ -28650,11 +28679,7 @@
             </a:pPr>
             <a:r>
               <a:rPr lang="hy-AM" sz="2400" dirty="0" smtClean="0"/>
-              <a:t>պատկերի </a:t>
-            </a:r>
-            <a:r>
-              <a:rPr lang="hy-AM" sz="2400" dirty="0" smtClean="0"/>
-              <a:t>մեջ հայտնաբերել ուղիղ գծերը,</a:t>
+              <a:t>պատկերի մեջ հայտնաբերել ուղիղ գծերը,</a:t>
             </a:r>
             <a:r>
               <a:rPr lang="en-US" sz="2400" dirty="0" smtClean="0"/>
@@ -30717,14 +30742,14 @@
                 <a:gridCol w="2616957">
                   <a:extLst>
                     <a:ext uri="{9D8B030D-6E8A-4147-A177-3AD203B41FA5}">
-                      <a16:colId xmlns="" xmlns:a16="http://schemas.microsoft.com/office/drawing/2014/main" val="3318161435"/>
+                      <a16:colId xmlns:a16="http://schemas.microsoft.com/office/drawing/2014/main" xmlns="" val="3318161435"/>
                     </a:ext>
                   </a:extLst>
                 </a:gridCol>
                 <a:gridCol w="2640843">
                   <a:extLst>
                     <a:ext uri="{9D8B030D-6E8A-4147-A177-3AD203B41FA5}">
-                      <a16:colId xmlns="" xmlns:a16="http://schemas.microsoft.com/office/drawing/2014/main" val="4127245324"/>
+                      <a16:colId xmlns:a16="http://schemas.microsoft.com/office/drawing/2014/main" xmlns="" val="4127245324"/>
                     </a:ext>
                   </a:extLst>
                 </a:gridCol>
@@ -30801,7 +30826,7 @@
                 </a:tc>
                 <a:extLst>
                   <a:ext uri="{0D108BD9-81ED-4DB2-BD59-A6C34878D82A}">
-                    <a16:rowId xmlns="" xmlns:a16="http://schemas.microsoft.com/office/drawing/2014/main" val="2750261522"/>
+                    <a16:rowId xmlns:a16="http://schemas.microsoft.com/office/drawing/2014/main" xmlns="" val="2750261522"/>
                   </a:ext>
                 </a:extLst>
               </a:tr>

</xml_diff>